<commit_message>
moving spec to latex
</commit_message>
<xml_diff>
--- a/10.17.pptx
+++ b/10.17.pptx
@@ -302,7 +302,7 @@
           <a:p>
             <a:fld id="{DBDCF32A-0251-DF45-8ADC-557809B81E02}" type="datetimeFigureOut">
               <a:rPr lang="en-US" smtClean="0"/>
-              <a:t>10/17/2018</a:t>
+              <a:t>1/17/2019</a:t>
             </a:fld>
             <a:endParaRPr lang="en-US"/>
           </a:p>
@@ -470,7 +470,7 @@
           <a:p>
             <a:fld id="{DBDCF32A-0251-DF45-8ADC-557809B81E02}" type="datetimeFigureOut">
               <a:rPr lang="en-US" smtClean="0"/>
-              <a:t>10/17/2018</a:t>
+              <a:t>1/17/2019</a:t>
             </a:fld>
             <a:endParaRPr lang="en-US"/>
           </a:p>
@@ -648,7 +648,7 @@
           <a:p>
             <a:fld id="{DBDCF32A-0251-DF45-8ADC-557809B81E02}" type="datetimeFigureOut">
               <a:rPr lang="en-US" smtClean="0"/>
-              <a:t>10/17/2018</a:t>
+              <a:t>1/17/2019</a:t>
             </a:fld>
             <a:endParaRPr lang="en-US"/>
           </a:p>
@@ -816,7 +816,7 @@
           <a:p>
             <a:fld id="{DBDCF32A-0251-DF45-8ADC-557809B81E02}" type="datetimeFigureOut">
               <a:rPr lang="en-US" smtClean="0"/>
-              <a:t>10/17/2018</a:t>
+              <a:t>1/17/2019</a:t>
             </a:fld>
             <a:endParaRPr lang="en-US"/>
           </a:p>
@@ -1061,7 +1061,7 @@
           <a:p>
             <a:fld id="{DBDCF32A-0251-DF45-8ADC-557809B81E02}" type="datetimeFigureOut">
               <a:rPr lang="en-US" smtClean="0"/>
-              <a:t>10/17/2018</a:t>
+              <a:t>1/17/2019</a:t>
             </a:fld>
             <a:endParaRPr lang="en-US"/>
           </a:p>
@@ -1346,7 +1346,7 @@
           <a:p>
             <a:fld id="{DBDCF32A-0251-DF45-8ADC-557809B81E02}" type="datetimeFigureOut">
               <a:rPr lang="en-US" smtClean="0"/>
-              <a:t>10/17/2018</a:t>
+              <a:t>1/17/2019</a:t>
             </a:fld>
             <a:endParaRPr lang="en-US"/>
           </a:p>
@@ -1765,7 +1765,7 @@
           <a:p>
             <a:fld id="{DBDCF32A-0251-DF45-8ADC-557809B81E02}" type="datetimeFigureOut">
               <a:rPr lang="en-US" smtClean="0"/>
-              <a:t>10/17/2018</a:t>
+              <a:t>1/17/2019</a:t>
             </a:fld>
             <a:endParaRPr lang="en-US"/>
           </a:p>
@@ -1882,7 +1882,7 @@
           <a:p>
             <a:fld id="{DBDCF32A-0251-DF45-8ADC-557809B81E02}" type="datetimeFigureOut">
               <a:rPr lang="en-US" smtClean="0"/>
-              <a:t>10/17/2018</a:t>
+              <a:t>1/17/2019</a:t>
             </a:fld>
             <a:endParaRPr lang="en-US"/>
           </a:p>
@@ -1977,7 +1977,7 @@
           <a:p>
             <a:fld id="{DBDCF32A-0251-DF45-8ADC-557809B81E02}" type="datetimeFigureOut">
               <a:rPr lang="en-US" smtClean="0"/>
-              <a:t>10/17/2018</a:t>
+              <a:t>1/17/2019</a:t>
             </a:fld>
             <a:endParaRPr lang="en-US"/>
           </a:p>
@@ -2252,7 +2252,7 @@
           <a:p>
             <a:fld id="{DBDCF32A-0251-DF45-8ADC-557809B81E02}" type="datetimeFigureOut">
               <a:rPr lang="en-US" smtClean="0"/>
-              <a:t>10/17/2018</a:t>
+              <a:t>1/17/2019</a:t>
             </a:fld>
             <a:endParaRPr lang="en-US"/>
           </a:p>
@@ -2504,7 +2504,7 @@
           <a:p>
             <a:fld id="{DBDCF32A-0251-DF45-8ADC-557809B81E02}" type="datetimeFigureOut">
               <a:rPr lang="en-US" smtClean="0"/>
-              <a:t>10/17/2018</a:t>
+              <a:t>1/17/2019</a:t>
             </a:fld>
             <a:endParaRPr lang="en-US"/>
           </a:p>
@@ -2720,7 +2720,7 @@
           <a:p>
             <a:fld id="{DBDCF32A-0251-DF45-8ADC-557809B81E02}" type="datetimeFigureOut">
               <a:rPr lang="en-US" smtClean="0"/>
-              <a:t>10/17/2018</a:t>
+              <a:t>1/17/2019</a:t>
             </a:fld>
             <a:endParaRPr lang="en-US"/>
           </a:p>
@@ -3112,7 +3112,7 @@
           <p:nvPr>
             <p:extLst>
               <p:ext uri="{D42A27DB-BD31-4B8C-83A1-F6EECF244321}">
-                <p14:modId xmlns:p14="http://schemas.microsoft.com/office/powerpoint/2010/main" val="2751013875"/>
+                <p14:modId xmlns:p14="http://schemas.microsoft.com/office/powerpoint/2010/main" val="2988210338"/>
               </p:ext>
             </p:extLst>
           </p:nvPr>
@@ -3270,79 +3270,7 @@
                           <a:ea typeface="+mn-ea"/>
                           <a:cs typeface="Calibri" pitchFamily="34" charset="0"/>
                         </a:rPr>
-                        <a:t>Ammon installed ROS where he had a lot of issues due to their automated script failing. He was eventually able to figure it out. Ammon completed the design spec.</a:t>
-                      </a:r>
-                    </a:p>
-                    <a:p>
-                      <a:pPr marL="190500" marR="0" lvl="0" indent="-190500" algn="l" defTabSz="695325" rtl="0" eaLnBrk="1" fontAlgn="base" latinLnBrk="0" hangingPunct="1">
-                        <a:lnSpc>
-                          <a:spcPct val="90000"/>
-                        </a:lnSpc>
-                        <a:spcBef>
-                          <a:spcPct val="30000"/>
-                        </a:spcBef>
-                        <a:spcAft>
-                          <a:spcPct val="0"/>
-                        </a:spcAft>
-                        <a:buClr>
-                          <a:srgbClr val="0A1B5F"/>
-                        </a:buClr>
-                        <a:buSzTx/>
-                        <a:buFontTx/>
-                        <a:buChar char="•"/>
-                        <a:tabLst/>
-                        <a:defRPr/>
-                      </a:pPr>
-                      <a:r>
-                        <a:rPr kumimoji="0" lang="en-AU" sz="1400" b="0" i="0" u="none" strike="noStrike" kern="1200" cap="none" normalizeH="0" baseline="0" dirty="0">
-                          <a:ln>
-                            <a:noFill/>
-                          </a:ln>
-                          <a:solidFill>
-                            <a:schemeClr val="tx1"/>
-                          </a:solidFill>
-                          <a:effectLst/>
-                          <a:latin typeface="Calibri" pitchFamily="34" charset="0"/>
-                          <a:ea typeface="+mn-ea"/>
-                          <a:cs typeface="Calibri" pitchFamily="34" charset="0"/>
-                        </a:rPr>
-                        <a:t>Jake also installed ROS and started looking over the first tutorial on learning ROS. Jake completed the weekly report.</a:t>
-                      </a:r>
-                    </a:p>
-                    <a:p>
-                      <a:pPr marL="190500" marR="0" lvl="0" indent="-190500" algn="l" defTabSz="695325" rtl="0" eaLnBrk="1" fontAlgn="base" latinLnBrk="0" hangingPunct="1">
-                        <a:lnSpc>
-                          <a:spcPct val="90000"/>
-                        </a:lnSpc>
-                        <a:spcBef>
-                          <a:spcPct val="30000"/>
-                        </a:spcBef>
-                        <a:spcAft>
-                          <a:spcPct val="0"/>
-                        </a:spcAft>
-                        <a:buClr>
-                          <a:srgbClr val="0A1B5F"/>
-                        </a:buClr>
-                        <a:buSzTx/>
-                        <a:buFontTx/>
-                        <a:buChar char="•"/>
-                        <a:tabLst/>
-                        <a:defRPr/>
-                      </a:pPr>
-                      <a:r>
-                        <a:rPr kumimoji="0" lang="en-AU" sz="1400" b="0" i="0" u="none" strike="noStrike" kern="1200" cap="none" normalizeH="0" baseline="0" dirty="0">
-                          <a:ln>
-                            <a:noFill/>
-                          </a:ln>
-                          <a:solidFill>
-                            <a:schemeClr val="tx1"/>
-                          </a:solidFill>
-                          <a:effectLst/>
-                          <a:latin typeface="Calibri" pitchFamily="34" charset="0"/>
-                          <a:ea typeface="+mn-ea"/>
-                          <a:cs typeface="Calibri" pitchFamily="34" charset="0"/>
-                        </a:rPr>
-                        <a:t>Alex did not install ROS but he did complete the road map and schedule.</a:t>
+                        <a:t>.</a:t>
                       </a:r>
                     </a:p>
                   </a:txBody>
@@ -8175,7 +8103,7 @@
         </p:nvSpPr>
         <p:spPr>
           <a:xfrm>
-            <a:off x="6644584" y="1910345"/>
+            <a:off x="6636117" y="1901878"/>
             <a:ext cx="228600" cy="181510"/>
           </a:xfrm>
           <a:prstGeom prst="ellipse">
@@ -8364,6 +8292,53 @@
         <p:spPr>
           <a:xfrm>
             <a:off x="8331200" y="3803976"/>
+            <a:ext cx="228600" cy="181510"/>
+          </a:xfrm>
+          <a:prstGeom prst="ellipse">
+            <a:avLst/>
+          </a:prstGeom>
+          <a:solidFill>
+            <a:srgbClr val="008000"/>
+          </a:solidFill>
+        </p:spPr>
+        <p:style>
+          <a:lnRef idx="1">
+            <a:schemeClr val="accent1"/>
+          </a:lnRef>
+          <a:fillRef idx="3">
+            <a:schemeClr val="accent1"/>
+          </a:fillRef>
+          <a:effectRef idx="2">
+            <a:schemeClr val="accent1"/>
+          </a:effectRef>
+          <a:fontRef idx="minor">
+            <a:schemeClr val="lt1"/>
+          </a:fontRef>
+        </p:style>
+        <p:txBody>
+          <a:bodyPr rtlCol="0" anchor="ctr"/>
+          <a:lstStyle/>
+          <a:p>
+            <a:pPr algn="ctr"/>
+            <a:endParaRPr lang="en-US"/>
+          </a:p>
+        </p:txBody>
+      </p:sp>
+      <p:sp>
+        <p:nvSpPr>
+          <p:cNvPr id="25" name="Oval 24">
+            <a:extLst>
+              <a:ext uri="{FF2B5EF4-FFF2-40B4-BE49-F238E27FC236}">
+                <a16:creationId xmlns:a16="http://schemas.microsoft.com/office/drawing/2014/main" id="{381C69C6-5277-43CF-B628-08B6C9DE5F46}"/>
+              </a:ext>
+            </a:extLst>
+          </p:cNvPr>
+          <p:cNvSpPr/>
+          <p:nvPr/>
+        </p:nvSpPr>
+        <p:spPr>
+          <a:xfrm>
+            <a:off x="6629398" y="1361279"/>
             <a:ext cx="228600" cy="181510"/>
           </a:xfrm>
           <a:prstGeom prst="ellipse">

</xml_diff>